<commit_message>
feat: remove packages/, example/
</commit_message>
<xml_diff>
--- a/lessons/0_introduce/课程介绍.pptx
+++ b/lessons/0_introduce/课程介绍.pptx
@@ -6748,6 +6748,58 @@
           </a:p>
         </p:txBody>
       </p:sp>
+      <p:sp>
+        <p:nvSpPr>
+          <p:cNvPr id="4" name="文本框 3"/>
+          <p:cNvSpPr txBox="1"/>
+          <p:nvPr/>
+        </p:nvSpPr>
+        <p:spPr>
+          <a:xfrm>
+            <a:off x="6794500" y="2115185"/>
+            <a:ext cx="2051685" cy="645160"/>
+          </a:xfrm>
+          <a:prstGeom prst="rect">
+            <a:avLst/>
+          </a:prstGeom>
+          <a:noFill/>
+        </p:spPr>
+        <p:txBody>
+          <a:bodyPr wrap="square" rtlCol="0">
+            <a:spAutoFit/>
+          </a:bodyPr>
+          <a:p>
+            <a:pPr marL="285750" indent="-285750">
+              <a:buFont typeface="Arial" panose="020B0604020202020204" pitchFamily="34" charset="0"/>
+              <a:buChar char="•"/>
+            </a:pPr>
+            <a:r>
+              <a:rPr lang="zh-CN" altLang="en-US"/>
+              <a:t>本地</a:t>
+            </a:r>
+            <a:r>
+              <a:rPr lang="zh-CN" altLang="en-US"/>
+              <a:t>实现</a:t>
+            </a:r>
+            <a:endParaRPr lang="zh-CN" altLang="en-US"/>
+          </a:p>
+          <a:p>
+            <a:pPr marL="285750" indent="-285750">
+              <a:buFont typeface="Arial" panose="020B0604020202020204" pitchFamily="34" charset="0"/>
+              <a:buChar char="•"/>
+            </a:pPr>
+            <a:r>
+              <a:rPr lang="zh-CN" altLang="en-US"/>
+              <a:t>平台</a:t>
+            </a:r>
+            <a:r>
+              <a:rPr lang="zh-CN" altLang="en-US"/>
+              <a:t>实现</a:t>
+            </a:r>
+            <a:endParaRPr lang="zh-CN" altLang="en-US"/>
+          </a:p>
+        </p:txBody>
+      </p:sp>
     </p:spTree>
     <p:custDataLst>
       <p:tags r:id="rId1"/>
@@ -6924,7 +6976,7 @@
                             </p:stCondLst>
                             <p:childTnLst>
                               <p:par>
-                                <p:cTn id="17" presetID="1" presetClass="entr" presetSubtype="0" fill="hold" grpId="0" nodeType="clickEffect">
+                                <p:cTn id="17" presetID="1" presetClass="entr" presetSubtype="0" fill="hold" nodeType="clickEffect">
                                   <p:stCondLst>
                                     <p:cond delay="0"/>
                                   </p:stCondLst>
@@ -6932,6 +6984,86 @@
                                     <p:set>
                                       <p:cBhvr>
                                         <p:cTn id="18" dur="1" fill="hold">
+                                          <p:stCondLst>
+                                            <p:cond delay="0"/>
+                                          </p:stCondLst>
+                                        </p:cTn>
+                                        <p:tgtEl>
+                                          <p:spTgt spid="4">
+                                            <p:txEl>
+                                              <p:pRg st="0" end="0"/>
+                                            </p:txEl>
+                                          </p:spTgt>
+                                        </p:tgtEl>
+                                        <p:attrNameLst>
+                                          <p:attrName>style.visibility</p:attrName>
+                                        </p:attrNameLst>
+                                      </p:cBhvr>
+                                      <p:to>
+                                        <p:strVal val="visible"/>
+                                      </p:to>
+                                    </p:set>
+                                  </p:childTnLst>
+                                </p:cTn>
+                              </p:par>
+                              <p:par>
+                                <p:cTn id="19" presetID="1" presetClass="entr" presetSubtype="0" fill="hold" nodeType="withEffect">
+                                  <p:stCondLst>
+                                    <p:cond delay="0"/>
+                                  </p:stCondLst>
+                                  <p:childTnLst>
+                                    <p:set>
+                                      <p:cBhvr>
+                                        <p:cTn id="20" dur="1" fill="hold">
+                                          <p:stCondLst>
+                                            <p:cond delay="0"/>
+                                          </p:stCondLst>
+                                        </p:cTn>
+                                        <p:tgtEl>
+                                          <p:spTgt spid="4">
+                                            <p:txEl>
+                                              <p:pRg st="1" end="1"/>
+                                            </p:txEl>
+                                          </p:spTgt>
+                                        </p:tgtEl>
+                                        <p:attrNameLst>
+                                          <p:attrName>style.visibility</p:attrName>
+                                        </p:attrNameLst>
+                                      </p:cBhvr>
+                                      <p:to>
+                                        <p:strVal val="visible"/>
+                                      </p:to>
+                                    </p:set>
+                                  </p:childTnLst>
+                                </p:cTn>
+                              </p:par>
+                            </p:childTnLst>
+                          </p:cTn>
+                        </p:par>
+                      </p:childTnLst>
+                    </p:cTn>
+                  </p:par>
+                  <p:par>
+                    <p:cTn id="21" fill="hold">
+                      <p:stCondLst>
+                        <p:cond delay="indefinite"/>
+                      </p:stCondLst>
+                      <p:childTnLst>
+                        <p:par>
+                          <p:cTn id="22" fill="hold">
+                            <p:stCondLst>
+                              <p:cond delay="0"/>
+                            </p:stCondLst>
+                            <p:childTnLst>
+                              <p:par>
+                                <p:cTn id="23" presetID="1" presetClass="entr" presetSubtype="0" fill="hold" grpId="0" nodeType="clickEffect">
+                                  <p:stCondLst>
+                                    <p:cond delay="0"/>
+                                  </p:stCondLst>
+                                  <p:childTnLst>
+                                    <p:set>
+                                      <p:cBhvr>
+                                        <p:cTn id="24" dur="1" fill="hold">
                                           <p:stCondLst>
                                             <p:cond delay="0"/>
                                           </p:stCondLst>
@@ -6961,26 +7093,26 @@
                     </p:cTn>
                   </p:par>
                   <p:par>
-                    <p:cTn id="19" fill="hold">
+                    <p:cTn id="25" fill="hold">
                       <p:stCondLst>
                         <p:cond delay="indefinite"/>
                       </p:stCondLst>
                       <p:childTnLst>
                         <p:par>
-                          <p:cTn id="20" fill="hold">
+                          <p:cTn id="26" fill="hold">
                             <p:stCondLst>
                               <p:cond delay="0"/>
                             </p:stCondLst>
                             <p:childTnLst>
                               <p:par>
-                                <p:cTn id="21" presetID="1" presetClass="entr" presetSubtype="0" fill="hold" grpId="0" nodeType="clickEffect">
+                                <p:cTn id="27" presetID="1" presetClass="entr" presetSubtype="0" fill="hold" grpId="0" nodeType="clickEffect">
                                   <p:stCondLst>
                                     <p:cond delay="0"/>
                                   </p:stCondLst>
                                   <p:childTnLst>
                                     <p:set>
                                       <p:cBhvr>
-                                        <p:cTn id="22" dur="1" fill="hold">
+                                        <p:cTn id="28" dur="1" fill="hold">
                                           <p:stCondLst>
                                             <p:cond delay="0"/>
                                           </p:stCondLst>
@@ -7010,26 +7142,26 @@
                     </p:cTn>
                   </p:par>
                   <p:par>
-                    <p:cTn id="23" fill="hold">
+                    <p:cTn id="29" fill="hold">
                       <p:stCondLst>
                         <p:cond delay="indefinite"/>
                       </p:stCondLst>
                       <p:childTnLst>
                         <p:par>
-                          <p:cTn id="24" fill="hold">
+                          <p:cTn id="30" fill="hold">
                             <p:stCondLst>
                               <p:cond delay="0"/>
                             </p:stCondLst>
                             <p:childTnLst>
                               <p:par>
-                                <p:cTn id="25" presetID="1" presetClass="entr" presetSubtype="0" fill="hold" grpId="0" nodeType="clickEffect">
+                                <p:cTn id="31" presetID="1" presetClass="entr" presetSubtype="0" fill="hold" grpId="0" nodeType="clickEffect">
                                   <p:stCondLst>
                                     <p:cond delay="0"/>
                                   </p:stCondLst>
                                   <p:childTnLst>
                                     <p:set>
                                       <p:cBhvr>
-                                        <p:cTn id="26" dur="1" fill="hold">
+                                        <p:cTn id="32" dur="1" fill="hold">
                                           <p:stCondLst>
                                             <p:cond delay="0"/>
                                           </p:stCondLst>
@@ -7059,26 +7191,26 @@
                     </p:cTn>
                   </p:par>
                   <p:par>
-                    <p:cTn id="27" fill="hold">
+                    <p:cTn id="33" fill="hold">
                       <p:stCondLst>
                         <p:cond delay="indefinite"/>
                       </p:stCondLst>
                       <p:childTnLst>
                         <p:par>
-                          <p:cTn id="28" fill="hold">
+                          <p:cTn id="34" fill="hold">
                             <p:stCondLst>
                               <p:cond delay="0"/>
                             </p:stCondLst>
                             <p:childTnLst>
                               <p:par>
-                                <p:cTn id="29" presetID="1" presetClass="entr" presetSubtype="0" fill="hold" grpId="0" nodeType="clickEffect">
+                                <p:cTn id="35" presetID="1" presetClass="entr" presetSubtype="0" fill="hold" grpId="0" nodeType="clickEffect">
                                   <p:stCondLst>
                                     <p:cond delay="0"/>
                                   </p:stCondLst>
                                   <p:childTnLst>
                                     <p:set>
                                       <p:cBhvr>
-                                        <p:cTn id="30" dur="1" fill="hold">
+                                        <p:cTn id="36" dur="1" fill="hold">
                                           <p:stCondLst>
                                             <p:cond delay="0"/>
                                           </p:stCondLst>
@@ -7108,26 +7240,26 @@
                     </p:cTn>
                   </p:par>
                   <p:par>
-                    <p:cTn id="31" fill="hold">
+                    <p:cTn id="37" fill="hold">
                       <p:stCondLst>
                         <p:cond delay="indefinite"/>
                       </p:stCondLst>
                       <p:childTnLst>
                         <p:par>
-                          <p:cTn id="32" fill="hold">
+                          <p:cTn id="38" fill="hold">
                             <p:stCondLst>
                               <p:cond delay="0"/>
                             </p:stCondLst>
                             <p:childTnLst>
                               <p:par>
-                                <p:cTn id="33" presetID="1" presetClass="entr" presetSubtype="0" fill="hold" grpId="0" nodeType="clickEffect">
+                                <p:cTn id="39" presetID="1" presetClass="entr" presetSubtype="0" fill="hold" grpId="0" nodeType="clickEffect">
                                   <p:stCondLst>
                                     <p:cond delay="0"/>
                                   </p:stCondLst>
                                   <p:childTnLst>
                                     <p:set>
                                       <p:cBhvr>
-                                        <p:cTn id="34" dur="1" fill="hold">
+                                        <p:cTn id="40" dur="1" fill="hold">
                                           <p:stCondLst>
                                             <p:cond delay="0"/>
                                           </p:stCondLst>
@@ -7178,7 +7310,7 @@
       </p:par>
     </p:tnLst>
     <p:bldLst>
-      <p:bldP spid="2" grpId="0" build="p"/>
+      <p:bldP spid="2" grpId="0" uiExpand="1" build="p"/>
       <p:bldP spid="2" grpId="1" build="p"/>
     </p:bldLst>
   </p:timing>
@@ -9472,13 +9604,13 @@
             </a:pPr>
             <a:r>
               <a:rPr lang="zh-CN" altLang="en-US"/>
-              <a:t>用户通过拖拽等可视化操作，再配上少量代码，即可像积木一样快速开发</a:t>
+              <a:t>用户通过拖拽等可视化操作，再配上少量代码，即可像搭积木一样快速开发</a:t>
             </a:r>
             <a:r>
               <a:rPr>
                 <a:sym typeface="+mn-ea"/>
               </a:rPr>
-              <a:t>Web3D编辑器、</a:t>
+              <a:t>Web3D编辑器和</a:t>
             </a:r>
             <a:r>
               <a:rPr lang="en-US" altLang="zh-CN">

</xml_diff>